<commit_message>
chore[docs]: update report ppt
</commit_message>
<xml_diff>
--- a/docs/WeeklyNotes/Report-Sep28-2022-reasons-overview.pptx
+++ b/docs/WeeklyNotes/Report-Sep28-2022-reasons-overview.pptx
@@ -2787,7 +2787,7 @@
           <a:p>
             <a:fld id="{71BD4573-58E7-4156-A133-2731F5F8D1A6}" type="datetimeFigureOut">
               <a:rPr lang="en-US" smtClean="0"/>
-              <a:t>9/28/2022</a:t>
+              <a:t>10/3/2022</a:t>
             </a:fld>
             <a:endParaRPr lang="en-US"/>
           </a:p>
@@ -3452,7 +3452,7 @@
           <a:p>
             <a:fld id="{021A1D30-C0A0-4124-A783-34D9F15FA0FE}" type="datetime1">
               <a:rPr lang="en-US" smtClean="0"/>
-              <a:t>9/28/2022</a:t>
+              <a:t>10/3/2022</a:t>
             </a:fld>
             <a:endParaRPr lang="en-US"/>
           </a:p>
@@ -3636,7 +3636,7 @@
           <a:p>
             <a:fld id="{8D2D5871-AB0F-4B3D-8861-97E78CB7B47E}" type="datetime1">
               <a:rPr lang="en-US" smtClean="0"/>
-              <a:t>9/28/2022</a:t>
+              <a:t>10/3/2022</a:t>
             </a:fld>
             <a:endParaRPr lang="en-US"/>
           </a:p>
@@ -3830,7 +3830,7 @@
           <a:p>
             <a:fld id="{14418406-4C3F-4F3E-80BD-A22568EA37EB}" type="datetime1">
               <a:rPr lang="en-US" smtClean="0"/>
-              <a:t>9/28/2022</a:t>
+              <a:t>10/3/2022</a:t>
             </a:fld>
             <a:endParaRPr lang="en-US"/>
           </a:p>
@@ -4014,7 +4014,7 @@
           <a:p>
             <a:fld id="{65F28077-7188-48C5-8679-2287FAC952E9}" type="datetime1">
               <a:rPr lang="en-US" smtClean="0"/>
-              <a:t>9/28/2022</a:t>
+              <a:t>10/3/2022</a:t>
             </a:fld>
             <a:endParaRPr lang="en-US"/>
           </a:p>
@@ -4261,7 +4261,7 @@
           <a:p>
             <a:fld id="{D2DCB740-6776-4EE9-99FD-96D592FA5A23}" type="datetime1">
               <a:rPr lang="en-US" smtClean="0"/>
-              <a:t>9/28/2022</a:t>
+              <a:t>10/3/2022</a:t>
             </a:fld>
             <a:endParaRPr lang="en-US"/>
           </a:p>
@@ -4544,7 +4544,7 @@
           <a:p>
             <a:fld id="{05F6BD99-6FFD-46C5-B5E2-43A34BDA2566}" type="datetime1">
               <a:rPr lang="en-US" smtClean="0"/>
-              <a:t>9/28/2022</a:t>
+              <a:t>10/3/2022</a:t>
             </a:fld>
             <a:endParaRPr lang="en-US"/>
           </a:p>
@@ -4941,7 +4941,7 @@
           <a:p>
             <a:fld id="{E022678E-214C-4CF8-97C7-95015FB02960}" type="datetime1">
               <a:rPr lang="en-US" smtClean="0"/>
-              <a:t>9/28/2022</a:t>
+              <a:t>10/3/2022</a:t>
             </a:fld>
             <a:endParaRPr lang="en-US"/>
           </a:p>
@@ -5110,7 +5110,7 @@
           <a:p>
             <a:fld id="{D55660E0-FA77-4473-A859-74127B089143}" type="datetime1">
               <a:rPr lang="en-US" smtClean="0"/>
-              <a:t>9/28/2022</a:t>
+              <a:t>10/3/2022</a:t>
             </a:fld>
             <a:endParaRPr lang="en-US"/>
           </a:p>
@@ -5220,7 +5220,7 @@
           <a:p>
             <a:fld id="{3188D7B8-9F07-4899-827D-5F3CFDDEB574}" type="datetime1">
               <a:rPr lang="en-US" smtClean="0"/>
-              <a:t>9/28/2022</a:t>
+              <a:t>10/3/2022</a:t>
             </a:fld>
             <a:endParaRPr lang="en-US"/>
           </a:p>
@@ -5500,7 +5500,7 @@
           <a:p>
             <a:fld id="{B5197C5C-1CD1-417D-A89C-14747F5222C7}" type="datetime1">
               <a:rPr lang="en-US" smtClean="0"/>
-              <a:t>9/28/2022</a:t>
+              <a:t>10/3/2022</a:t>
             </a:fld>
             <a:endParaRPr lang="en-US"/>
           </a:p>
@@ -5853,7 +5853,7 @@
           <a:p>
             <a:fld id="{1359EFBB-CFA1-4AA8-9123-F0B52DBD84FE}" type="datetime1">
               <a:rPr lang="en-US" smtClean="0"/>
-              <a:t>9/28/2022</a:t>
+              <a:t>10/3/2022</a:t>
             </a:fld>
             <a:endParaRPr lang="en-US"/>
           </a:p>
@@ -6887,7 +6887,7 @@
             <a:fld id="{61146459-E3C3-4969-9224-5ED50B492D17}" type="datetime1">
               <a:rPr lang="en-US" smtClean="0"/>
               <a:pPr/>
-              <a:t>9/28/2022</a:t>
+              <a:t>10/3/2022</a:t>
             </a:fld>
             <a:endParaRPr lang="en-US" dirty="0"/>
           </a:p>
@@ -7871,12 +7871,66 @@
           </a:p>
         </p:txBody>
       </p:sp>
+      <p:sp>
+        <p:nvSpPr>
+          <p:cNvPr id="2" name="TextBox 1">
+            <a:extLst>
+              <a:ext uri="{FF2B5EF4-FFF2-40B4-BE49-F238E27FC236}">
+                <a16:creationId xmlns:a16="http://schemas.microsoft.com/office/drawing/2014/main" id="{297E1230-7CC3-44AD-AE98-29558F930AE0}"/>
+              </a:ext>
+            </a:extLst>
+          </p:cNvPr>
+          <p:cNvSpPr txBox="1"/>
+          <p:nvPr/>
+        </p:nvSpPr>
+        <p:spPr>
+          <a:xfrm>
+            <a:off x="609600" y="1847088"/>
+            <a:ext cx="9428086" cy="830997"/>
+          </a:xfrm>
+          <a:prstGeom prst="rect">
+            <a:avLst/>
+          </a:prstGeom>
+          <a:noFill/>
+          <a:ln>
+            <a:noFill/>
+          </a:ln>
+        </p:spPr>
+        <p:txBody>
+          <a:bodyPr wrap="square" rtlCol="0">
+            <a:spAutoFit/>
+          </a:bodyPr>
+          <a:lstStyle/>
+          <a:p>
+            <a:r>
+              <a:rPr lang="en-US" sz="2400" dirty="0">
+                <a:latin typeface="Calibri" panose="020F0502020204030204" pitchFamily="34" charset="0"/>
+                <a:cs typeface="Calibri" panose="020F0502020204030204" pitchFamily="34" charset="0"/>
+              </a:rPr>
+              <a:t>While other previous studies are based on video simulation.</a:t>
+            </a:r>
+            <a:br>
+              <a:rPr lang="en-US" sz="2400" dirty="0">
+                <a:latin typeface="Calibri" panose="020F0502020204030204" pitchFamily="34" charset="0"/>
+                <a:cs typeface="Calibri" panose="020F0502020204030204" pitchFamily="34" charset="0"/>
+              </a:rPr>
+            </a:br>
+            <a:r>
+              <a:rPr lang="en-US" sz="2400" dirty="0">
+                <a:latin typeface="Calibri" panose="020F0502020204030204" pitchFamily="34" charset="0"/>
+                <a:cs typeface="Calibri" panose="020F0502020204030204" pitchFamily="34" charset="0"/>
+              </a:rPr>
+              <a:t>The improvement and also challenge of this project is Real-Time constraint</a:t>
+            </a:r>
+          </a:p>
+        </p:txBody>
+      </p:sp>
       <p:pic>
         <p:nvPicPr>
-          <p:cNvPr id="6" name="Picture 5" descr="Diagram&#10;&#10;Description automatically generated">
+          <p:cNvPr id="5" name="Picture 4" descr="Diagram&#10;&#10;Description automatically generated">
             <a:extLst>
               <a:ext uri="{FF2B5EF4-FFF2-40B4-BE49-F238E27FC236}">
-                <a16:creationId xmlns:a16="http://schemas.microsoft.com/office/drawing/2014/main" id="{A619A1EF-8BB4-457F-BD56-8D615B8EB574}"/>
+                <a16:creationId xmlns:a16="http://schemas.microsoft.com/office/drawing/2014/main" id="{5D4149DC-681D-BEF7-6611-5578304FCE3B}"/>
               </a:ext>
             </a:extLst>
           </p:cNvPr>
@@ -7899,68 +7953,14 @@
         </p:blipFill>
         <p:spPr>
           <a:xfrm>
-            <a:off x="0" y="2884340"/>
-            <a:ext cx="12192000" cy="2740565"/>
+            <a:off x="419100" y="2790388"/>
+            <a:ext cx="11353800" cy="2971800"/>
           </a:xfrm>
           <a:prstGeom prst="rect">
             <a:avLst/>
           </a:prstGeom>
         </p:spPr>
       </p:pic>
-      <p:sp>
-        <p:nvSpPr>
-          <p:cNvPr id="2" name="TextBox 1">
-            <a:extLst>
-              <a:ext uri="{FF2B5EF4-FFF2-40B4-BE49-F238E27FC236}">
-                <a16:creationId xmlns:a16="http://schemas.microsoft.com/office/drawing/2014/main" id="{297E1230-7CC3-44AD-AE98-29558F930AE0}"/>
-              </a:ext>
-            </a:extLst>
-          </p:cNvPr>
-          <p:cNvSpPr txBox="1"/>
-          <p:nvPr/>
-        </p:nvSpPr>
-        <p:spPr>
-          <a:xfrm>
-            <a:off x="609600" y="1847088"/>
-            <a:ext cx="9428086" cy="830997"/>
-          </a:xfrm>
-          <a:prstGeom prst="rect">
-            <a:avLst/>
-          </a:prstGeom>
-          <a:noFill/>
-          <a:ln>
-            <a:noFill/>
-          </a:ln>
-        </p:spPr>
-        <p:txBody>
-          <a:bodyPr wrap="square" rtlCol="0">
-            <a:spAutoFit/>
-          </a:bodyPr>
-          <a:lstStyle/>
-          <a:p>
-            <a:r>
-              <a:rPr lang="en-US" sz="2400" dirty="0">
-                <a:latin typeface="Calibri" panose="020F0502020204030204" pitchFamily="34" charset="0"/>
-                <a:cs typeface="Calibri" panose="020F0502020204030204" pitchFamily="34" charset="0"/>
-              </a:rPr>
-              <a:t>While other previous studies are based on video simulation.</a:t>
-            </a:r>
-            <a:br>
-              <a:rPr lang="en-US" sz="2400" dirty="0">
-                <a:latin typeface="Calibri" panose="020F0502020204030204" pitchFamily="34" charset="0"/>
-                <a:cs typeface="Calibri" panose="020F0502020204030204" pitchFamily="34" charset="0"/>
-              </a:rPr>
-            </a:br>
-            <a:r>
-              <a:rPr lang="en-US" sz="2400" dirty="0">
-                <a:latin typeface="Calibri" panose="020F0502020204030204" pitchFamily="34" charset="0"/>
-                <a:cs typeface="Calibri" panose="020F0502020204030204" pitchFamily="34" charset="0"/>
-              </a:rPr>
-              <a:t>The improvement and also challenge of this project is Real-Time constraint</a:t>
-            </a:r>
-          </a:p>
-        </p:txBody>
-      </p:sp>
     </p:spTree>
     <p:extLst>
       <p:ext uri="{BB962C8B-B14F-4D97-AF65-F5344CB8AC3E}">

</xml_diff>

<commit_message>
chore[docs]: add algorithm description for report
</commit_message>
<xml_diff>
--- a/docs/WeeklyNotes/Report-Sep28-2022-reasons-overview.pptx
+++ b/docs/WeeklyNotes/Report-Sep28-2022-reasons-overview.pptx
@@ -2787,7 +2787,7 @@
           <a:p>
             <a:fld id="{71BD4573-58E7-4156-A133-2731F5F8D1A6}" type="datetimeFigureOut">
               <a:rPr lang="en-US" smtClean="0"/>
-              <a:t>10/3/2022</a:t>
+              <a:t>10/7/2022</a:t>
             </a:fld>
             <a:endParaRPr lang="en-US"/>
           </a:p>
@@ -3452,7 +3452,7 @@
           <a:p>
             <a:fld id="{021A1D30-C0A0-4124-A783-34D9F15FA0FE}" type="datetime1">
               <a:rPr lang="en-US" smtClean="0"/>
-              <a:t>10/3/2022</a:t>
+              <a:t>10/7/2022</a:t>
             </a:fld>
             <a:endParaRPr lang="en-US"/>
           </a:p>
@@ -3636,7 +3636,7 @@
           <a:p>
             <a:fld id="{8D2D5871-AB0F-4B3D-8861-97E78CB7B47E}" type="datetime1">
               <a:rPr lang="en-US" smtClean="0"/>
-              <a:t>10/3/2022</a:t>
+              <a:t>10/7/2022</a:t>
             </a:fld>
             <a:endParaRPr lang="en-US"/>
           </a:p>
@@ -3830,7 +3830,7 @@
           <a:p>
             <a:fld id="{14418406-4C3F-4F3E-80BD-A22568EA37EB}" type="datetime1">
               <a:rPr lang="en-US" smtClean="0"/>
-              <a:t>10/3/2022</a:t>
+              <a:t>10/7/2022</a:t>
             </a:fld>
             <a:endParaRPr lang="en-US"/>
           </a:p>
@@ -4014,7 +4014,7 @@
           <a:p>
             <a:fld id="{65F28077-7188-48C5-8679-2287FAC952E9}" type="datetime1">
               <a:rPr lang="en-US" smtClean="0"/>
-              <a:t>10/3/2022</a:t>
+              <a:t>10/7/2022</a:t>
             </a:fld>
             <a:endParaRPr lang="en-US"/>
           </a:p>
@@ -4261,7 +4261,7 @@
           <a:p>
             <a:fld id="{D2DCB740-6776-4EE9-99FD-96D592FA5A23}" type="datetime1">
               <a:rPr lang="en-US" smtClean="0"/>
-              <a:t>10/3/2022</a:t>
+              <a:t>10/7/2022</a:t>
             </a:fld>
             <a:endParaRPr lang="en-US"/>
           </a:p>
@@ -4544,7 +4544,7 @@
           <a:p>
             <a:fld id="{05F6BD99-6FFD-46C5-B5E2-43A34BDA2566}" type="datetime1">
               <a:rPr lang="en-US" smtClean="0"/>
-              <a:t>10/3/2022</a:t>
+              <a:t>10/7/2022</a:t>
             </a:fld>
             <a:endParaRPr lang="en-US"/>
           </a:p>
@@ -4941,7 +4941,7 @@
           <a:p>
             <a:fld id="{E022678E-214C-4CF8-97C7-95015FB02960}" type="datetime1">
               <a:rPr lang="en-US" smtClean="0"/>
-              <a:t>10/3/2022</a:t>
+              <a:t>10/7/2022</a:t>
             </a:fld>
             <a:endParaRPr lang="en-US"/>
           </a:p>
@@ -5110,7 +5110,7 @@
           <a:p>
             <a:fld id="{D55660E0-FA77-4473-A859-74127B089143}" type="datetime1">
               <a:rPr lang="en-US" smtClean="0"/>
-              <a:t>10/3/2022</a:t>
+              <a:t>10/7/2022</a:t>
             </a:fld>
             <a:endParaRPr lang="en-US"/>
           </a:p>
@@ -5220,7 +5220,7 @@
           <a:p>
             <a:fld id="{3188D7B8-9F07-4899-827D-5F3CFDDEB574}" type="datetime1">
               <a:rPr lang="en-US" smtClean="0"/>
-              <a:t>10/3/2022</a:t>
+              <a:t>10/7/2022</a:t>
             </a:fld>
             <a:endParaRPr lang="en-US"/>
           </a:p>
@@ -5500,7 +5500,7 @@
           <a:p>
             <a:fld id="{B5197C5C-1CD1-417D-A89C-14747F5222C7}" type="datetime1">
               <a:rPr lang="en-US" smtClean="0"/>
-              <a:t>10/3/2022</a:t>
+              <a:t>10/7/2022</a:t>
             </a:fld>
             <a:endParaRPr lang="en-US"/>
           </a:p>
@@ -5853,7 +5853,7 @@
           <a:p>
             <a:fld id="{1359EFBB-CFA1-4AA8-9123-F0B52DBD84FE}" type="datetime1">
               <a:rPr lang="en-US" smtClean="0"/>
-              <a:t>10/3/2022</a:t>
+              <a:t>10/7/2022</a:t>
             </a:fld>
             <a:endParaRPr lang="en-US"/>
           </a:p>
@@ -6887,7 +6887,7 @@
             <a:fld id="{61146459-E3C3-4969-9224-5ED50B492D17}" type="datetime1">
               <a:rPr lang="en-US" smtClean="0"/>
               <a:pPr/>
-              <a:t>10/3/2022</a:t>
+              <a:t>10/7/2022</a:t>
             </a:fld>
             <a:endParaRPr lang="en-US" dirty="0"/>
           </a:p>
@@ -8031,55 +8031,498 @@
           </a:p>
         </p:txBody>
       </p:sp>
-      <p:sp>
-        <p:nvSpPr>
-          <p:cNvPr id="3" name="Content Placeholder 2">
+      <p:graphicFrame>
+        <p:nvGraphicFramePr>
+          <p:cNvPr id="7" name="Table 7">
             <a:extLst>
               <a:ext uri="{FF2B5EF4-FFF2-40B4-BE49-F238E27FC236}">
-                <a16:creationId xmlns:a16="http://schemas.microsoft.com/office/drawing/2014/main" id="{CE0E6EFA-7504-439D-AC9C-1E3D41775153}"/>
+                <a16:creationId xmlns:a16="http://schemas.microsoft.com/office/drawing/2014/main" id="{3A56BB9A-ABD9-FE69-B2C3-5D5515A5531C}"/>
               </a:ext>
             </a:extLst>
           </p:cNvPr>
-          <p:cNvSpPr>
-            <a:spLocks noGrp="1"/>
-          </p:cNvSpPr>
+          <p:cNvGraphicFramePr>
+            <a:graphicFrameLocks noGrp="1"/>
+          </p:cNvGraphicFramePr>
           <p:nvPr>
             <p:ph idx="1"/>
+            <p:extLst>
+              <p:ext uri="{D42A27DB-BD31-4B8C-83A1-F6EECF244321}">
+                <p14:modId xmlns:p14="http://schemas.microsoft.com/office/powerpoint/2010/main" val="1295064176"/>
+              </p:ext>
+            </p:extLst>
           </p:nvPr>
-        </p:nvSpPr>
-        <p:spPr/>
-        <p:txBody>
-          <a:bodyPr/>
-          <a:lstStyle/>
-          <a:p>
-            <a:pPr marL="0" indent="0">
-              <a:buNone/>
-            </a:pPr>
-            <a:r>
-              <a:rPr lang="en-US" dirty="0"/>
-              <a:t>add algorithms to progress between stages</a:t>
-            </a:r>
-          </a:p>
-          <a:p>
-            <a:pPr marL="0" indent="0">
-              <a:buNone/>
-            </a:pPr>
-            <a:r>
-              <a:rPr lang="en-US" dirty="0"/>
-              <a:t>e.g. : stage 1 =&gt; which algorithm =&gt; stage 2</a:t>
-            </a:r>
-          </a:p>
-          <a:p>
-            <a:pPr marL="0" indent="0">
-              <a:buNone/>
-            </a:pPr>
-            <a:r>
-              <a:rPr lang="en-US" dirty="0"/>
-              <a:t>…</a:t>
-            </a:r>
-          </a:p>
-        </p:txBody>
-      </p:sp>
+        </p:nvGraphicFramePr>
+        <p:xfrm>
+          <a:off x="609600" y="1935163"/>
+          <a:ext cx="10972800" cy="3403600"/>
+        </p:xfrm>
+        <a:graphic>
+          <a:graphicData uri="http://schemas.openxmlformats.org/drawingml/2006/table">
+            <a:tbl>
+              <a:tblPr firstRow="1" bandRow="1">
+                <a:tableStyleId>{8799B23B-EC83-4686-B30A-512413B5E67A}</a:tableStyleId>
+              </a:tblPr>
+              <a:tblGrid>
+                <a:gridCol w="2743200">
+                  <a:extLst>
+                    <a:ext uri="{9D8B030D-6E8A-4147-A177-3AD203B41FA5}">
+                      <a16:colId xmlns:a16="http://schemas.microsoft.com/office/drawing/2014/main" val="951199745"/>
+                    </a:ext>
+                  </a:extLst>
+                </a:gridCol>
+                <a:gridCol w="2743200">
+                  <a:extLst>
+                    <a:ext uri="{9D8B030D-6E8A-4147-A177-3AD203B41FA5}">
+                      <a16:colId xmlns:a16="http://schemas.microsoft.com/office/drawing/2014/main" val="505646743"/>
+                    </a:ext>
+                  </a:extLst>
+                </a:gridCol>
+                <a:gridCol w="2743200">
+                  <a:extLst>
+                    <a:ext uri="{9D8B030D-6E8A-4147-A177-3AD203B41FA5}">
+                      <a16:colId xmlns:a16="http://schemas.microsoft.com/office/drawing/2014/main" val="3002240672"/>
+                    </a:ext>
+                  </a:extLst>
+                </a:gridCol>
+                <a:gridCol w="2743200">
+                  <a:extLst>
+                    <a:ext uri="{9D8B030D-6E8A-4147-A177-3AD203B41FA5}">
+                      <a16:colId xmlns:a16="http://schemas.microsoft.com/office/drawing/2014/main" val="4054116495"/>
+                    </a:ext>
+                  </a:extLst>
+                </a:gridCol>
+              </a:tblGrid>
+              <a:tr h="370840">
+                <a:tc>
+                  <a:txBody>
+                    <a:bodyPr/>
+                    <a:lstStyle/>
+                    <a:p>
+                      <a:endParaRPr lang="en-US" dirty="0"/>
+                    </a:p>
+                  </a:txBody>
+                  <a:tcPr/>
+                </a:tc>
+                <a:tc>
+                  <a:txBody>
+                    <a:bodyPr/>
+                    <a:lstStyle/>
+                    <a:p>
+                      <a:r>
+                        <a:rPr lang="en-US" dirty="0"/>
+                        <a:t>Operation</a:t>
+                      </a:r>
+                    </a:p>
+                  </a:txBody>
+                  <a:tcPr/>
+                </a:tc>
+                <a:tc>
+                  <a:txBody>
+                    <a:bodyPr/>
+                    <a:lstStyle/>
+                    <a:p>
+                      <a:r>
+                        <a:rPr lang="en-US" dirty="0"/>
+                        <a:t>Reference/Algorithm</a:t>
+                      </a:r>
+                    </a:p>
+                  </a:txBody>
+                  <a:tcPr/>
+                </a:tc>
+                <a:tc>
+                  <a:txBody>
+                    <a:bodyPr/>
+                    <a:lstStyle/>
+                    <a:p>
+                      <a:r>
+                        <a:rPr lang="en-US" dirty="0"/>
+                        <a:t>Objectives</a:t>
+                      </a:r>
+                    </a:p>
+                  </a:txBody>
+                  <a:tcPr/>
+                </a:tc>
+                <a:extLst>
+                  <a:ext uri="{0D108BD9-81ED-4DB2-BD59-A6C34878D82A}">
+                    <a16:rowId xmlns:a16="http://schemas.microsoft.com/office/drawing/2014/main" val="118325745"/>
+                  </a:ext>
+                </a:extLst>
+              </a:tr>
+              <a:tr h="370840">
+                <a:tc>
+                  <a:txBody>
+                    <a:bodyPr/>
+                    <a:lstStyle/>
+                    <a:p>
+                      <a:r>
+                        <a:rPr lang="en-US" dirty="0"/>
+                        <a:t>Stage 1</a:t>
+                      </a:r>
+                    </a:p>
+                  </a:txBody>
+                  <a:tcPr/>
+                </a:tc>
+                <a:tc>
+                  <a:txBody>
+                    <a:bodyPr/>
+                    <a:lstStyle/>
+                    <a:p>
+                      <a:pPr marL="0" marR="0" lvl="0" indent="0" algn="l" defTabSz="914400" rtl="0" eaLnBrk="1" fontAlgn="auto" latinLnBrk="0" hangingPunct="1">
+                        <a:lnSpc>
+                          <a:spcPct val="100000"/>
+                        </a:lnSpc>
+                        <a:spcBef>
+                          <a:spcPts val="0"/>
+                        </a:spcBef>
+                        <a:spcAft>
+                          <a:spcPts val="0"/>
+                        </a:spcAft>
+                        <a:buClrTx/>
+                        <a:buSzTx/>
+                        <a:buFontTx/>
+                        <a:buNone/>
+                        <a:tabLst/>
+                        <a:defRPr/>
+                      </a:pPr>
+                      <a:r>
+                        <a:rPr lang="en-US" dirty="0"/>
+                        <a:t>Capturing and Processing Video</a:t>
+                      </a:r>
+                    </a:p>
+                  </a:txBody>
+                  <a:tcPr/>
+                </a:tc>
+                <a:tc>
+                  <a:txBody>
+                    <a:bodyPr/>
+                    <a:lstStyle/>
+                    <a:p>
+                      <a:r>
+                        <a:rPr lang="en-US" dirty="0"/>
+                        <a:t>OpenCV, Pyplot,...</a:t>
+                      </a:r>
+                    </a:p>
+                  </a:txBody>
+                  <a:tcPr/>
+                </a:tc>
+                <a:tc>
+                  <a:txBody>
+                    <a:bodyPr/>
+                    <a:lstStyle/>
+                    <a:p>
+                      <a:r>
+                        <a:rPr lang="en-US" dirty="0"/>
+                        <a:t>Capture Real-time Video Data</a:t>
+                      </a:r>
+                    </a:p>
+                  </a:txBody>
+                  <a:tcPr/>
+                </a:tc>
+                <a:extLst>
+                  <a:ext uri="{0D108BD9-81ED-4DB2-BD59-A6C34878D82A}">
+                    <a16:rowId xmlns:a16="http://schemas.microsoft.com/office/drawing/2014/main" val="3297768754"/>
+                  </a:ext>
+                </a:extLst>
+              </a:tr>
+              <a:tr h="370840">
+                <a:tc>
+                  <a:txBody>
+                    <a:bodyPr/>
+                    <a:lstStyle/>
+                    <a:p>
+                      <a:r>
+                        <a:rPr lang="en-US" dirty="0"/>
+                        <a:t>Stage 2</a:t>
+                      </a:r>
+                    </a:p>
+                  </a:txBody>
+                  <a:tcPr/>
+                </a:tc>
+                <a:tc>
+                  <a:txBody>
+                    <a:bodyPr/>
+                    <a:lstStyle/>
+                    <a:p>
+                      <a:r>
+                        <a:rPr lang="en-US" dirty="0"/>
+                        <a:t>Region of Interests</a:t>
+                      </a:r>
+                    </a:p>
+                  </a:txBody>
+                  <a:tcPr/>
+                </a:tc>
+                <a:tc>
+                  <a:txBody>
+                    <a:bodyPr/>
+                    <a:lstStyle/>
+                    <a:p>
+                      <a:r>
+                        <a:rPr lang="en-US" dirty="0"/>
+                        <a:t>OpenCV, Pyplot…</a:t>
+                      </a:r>
+                    </a:p>
+                  </a:txBody>
+                  <a:tcPr/>
+                </a:tc>
+                <a:tc>
+                  <a:txBody>
+                    <a:bodyPr/>
+                    <a:lstStyle/>
+                    <a:p>
+                      <a:r>
+                        <a:rPr lang="en-US" dirty="0"/>
+                        <a:t>Ignore Background</a:t>
+                      </a:r>
+                    </a:p>
+                  </a:txBody>
+                  <a:tcPr/>
+                </a:tc>
+                <a:extLst>
+                  <a:ext uri="{0D108BD9-81ED-4DB2-BD59-A6C34878D82A}">
+                    <a16:rowId xmlns:a16="http://schemas.microsoft.com/office/drawing/2014/main" val="108585790"/>
+                  </a:ext>
+                </a:extLst>
+              </a:tr>
+              <a:tr h="370840">
+                <a:tc>
+                  <a:txBody>
+                    <a:bodyPr/>
+                    <a:lstStyle/>
+                    <a:p>
+                      <a:r>
+                        <a:rPr lang="en-US" dirty="0"/>
+                        <a:t>Stage 3</a:t>
+                      </a:r>
+                    </a:p>
+                  </a:txBody>
+                  <a:tcPr/>
+                </a:tc>
+                <a:tc>
+                  <a:txBody>
+                    <a:bodyPr/>
+                    <a:lstStyle/>
+                    <a:p>
+                      <a:r>
+                        <a:rPr lang="en-US" dirty="0"/>
+                        <a:t>Road Segmentation</a:t>
+                      </a:r>
+                    </a:p>
+                  </a:txBody>
+                  <a:tcPr/>
+                </a:tc>
+                <a:tc>
+                  <a:txBody>
+                    <a:bodyPr/>
+                    <a:lstStyle/>
+                    <a:p>
+                      <a:r>
+                        <a:rPr lang="en-US" dirty="0"/>
+                        <a:t>Image Thresholding</a:t>
+                      </a:r>
+                    </a:p>
+                  </a:txBody>
+                  <a:tcPr/>
+                </a:tc>
+                <a:tc>
+                  <a:txBody>
+                    <a:bodyPr/>
+                    <a:lstStyle/>
+                    <a:p>
+                      <a:r>
+                        <a:rPr lang="en-US" dirty="0"/>
+                        <a:t>Differentiate Lane lines and other segment</a:t>
+                      </a:r>
+                    </a:p>
+                  </a:txBody>
+                  <a:tcPr/>
+                </a:tc>
+                <a:extLst>
+                  <a:ext uri="{0D108BD9-81ED-4DB2-BD59-A6C34878D82A}">
+                    <a16:rowId xmlns:a16="http://schemas.microsoft.com/office/drawing/2014/main" val="3021584971"/>
+                  </a:ext>
+                </a:extLst>
+              </a:tr>
+              <a:tr h="370840">
+                <a:tc>
+                  <a:txBody>
+                    <a:bodyPr/>
+                    <a:lstStyle/>
+                    <a:p>
+                      <a:r>
+                        <a:rPr lang="en-US" dirty="0"/>
+                        <a:t>Stage 4</a:t>
+                      </a:r>
+                    </a:p>
+                  </a:txBody>
+                  <a:tcPr/>
+                </a:tc>
+                <a:tc>
+                  <a:txBody>
+                    <a:bodyPr/>
+                    <a:lstStyle/>
+                    <a:p>
+                      <a:r>
+                        <a:rPr lang="en-US" dirty="0"/>
+                        <a:t>Bird’s Eye View</a:t>
+                      </a:r>
+                    </a:p>
+                  </a:txBody>
+                  <a:tcPr/>
+                </a:tc>
+                <a:tc>
+                  <a:txBody>
+                    <a:bodyPr/>
+                    <a:lstStyle/>
+                    <a:p>
+                      <a:r>
+                        <a:rPr lang="en-US" dirty="0"/>
+                        <a:t>Inverse Perspective Mapping</a:t>
+                      </a:r>
+                    </a:p>
+                  </a:txBody>
+                  <a:tcPr/>
+                </a:tc>
+                <a:tc>
+                  <a:txBody>
+                    <a:bodyPr/>
+                    <a:lstStyle/>
+                    <a:p>
+                      <a:r>
+                        <a:rPr lang="en-US" dirty="0"/>
+                        <a:t>Curve Road Detection</a:t>
+                      </a:r>
+                    </a:p>
+                    <a:p>
+                      <a:r>
+                        <a:rPr lang="en-US" dirty="0"/>
+                        <a:t>Curvature Calculation</a:t>
+                      </a:r>
+                    </a:p>
+                  </a:txBody>
+                  <a:tcPr/>
+                </a:tc>
+                <a:extLst>
+                  <a:ext uri="{0D108BD9-81ED-4DB2-BD59-A6C34878D82A}">
+                    <a16:rowId xmlns:a16="http://schemas.microsoft.com/office/drawing/2014/main" val="3028632848"/>
+                  </a:ext>
+                </a:extLst>
+              </a:tr>
+              <a:tr h="370840">
+                <a:tc rowSpan="2">
+                  <a:txBody>
+                    <a:bodyPr/>
+                    <a:lstStyle/>
+                    <a:p>
+                      <a:r>
+                        <a:rPr lang="en-US" dirty="0"/>
+                        <a:t>Stage 5</a:t>
+                      </a:r>
+                    </a:p>
+                  </a:txBody>
+                  <a:tcPr/>
+                </a:tc>
+                <a:tc rowSpan="2">
+                  <a:txBody>
+                    <a:bodyPr/>
+                    <a:lstStyle/>
+                    <a:p>
+                      <a:r>
+                        <a:rPr lang="en-US" dirty="0"/>
+                        <a:t>Lane Marking</a:t>
+                      </a:r>
+                    </a:p>
+                  </a:txBody>
+                  <a:tcPr/>
+                </a:tc>
+                <a:tc>
+                  <a:txBody>
+                    <a:bodyPr/>
+                    <a:lstStyle/>
+                    <a:p>
+                      <a:r>
+                        <a:rPr lang="en-US" dirty="0"/>
+                        <a:t>Histogram Graph</a:t>
+                      </a:r>
+                    </a:p>
+                  </a:txBody>
+                  <a:tcPr/>
+                </a:tc>
+                <a:tc>
+                  <a:txBody>
+                    <a:bodyPr/>
+                    <a:lstStyle/>
+                    <a:p>
+                      <a:r>
+                        <a:rPr lang="en-US" dirty="0"/>
+                        <a:t>Lane lines Detection</a:t>
+                      </a:r>
+                    </a:p>
+                  </a:txBody>
+                  <a:tcPr/>
+                </a:tc>
+                <a:extLst>
+                  <a:ext uri="{0D108BD9-81ED-4DB2-BD59-A6C34878D82A}">
+                    <a16:rowId xmlns:a16="http://schemas.microsoft.com/office/drawing/2014/main" val="402439070"/>
+                  </a:ext>
+                </a:extLst>
+              </a:tr>
+              <a:tr h="370840">
+                <a:tc vMerge="1">
+                  <a:txBody>
+                    <a:bodyPr/>
+                    <a:lstStyle/>
+                    <a:p>
+                      <a:endParaRPr lang="en-US" dirty="0"/>
+                    </a:p>
+                  </a:txBody>
+                  <a:tcPr/>
+                </a:tc>
+                <a:tc vMerge="1">
+                  <a:txBody>
+                    <a:bodyPr/>
+                    <a:lstStyle/>
+                    <a:p>
+                      <a:endParaRPr lang="en-US" dirty="0"/>
+                    </a:p>
+                  </a:txBody>
+                  <a:tcPr/>
+                </a:tc>
+                <a:tc>
+                  <a:txBody>
+                    <a:bodyPr/>
+                    <a:lstStyle/>
+                    <a:p>
+                      <a:r>
+                        <a:rPr lang="en-US" dirty="0"/>
+                        <a:t>Sliding Windows</a:t>
+                      </a:r>
+                    </a:p>
+                  </a:txBody>
+                  <a:tcPr/>
+                </a:tc>
+                <a:tc>
+                  <a:txBody>
+                    <a:bodyPr/>
+                    <a:lstStyle/>
+                    <a:p>
+                      <a:r>
+                        <a:rPr lang="en-US" dirty="0"/>
+                        <a:t>Lane lines Marking</a:t>
+                      </a:r>
+                    </a:p>
+                  </a:txBody>
+                  <a:tcPr/>
+                </a:tc>
+                <a:extLst>
+                  <a:ext uri="{0D108BD9-81ED-4DB2-BD59-A6C34878D82A}">
+                    <a16:rowId xmlns:a16="http://schemas.microsoft.com/office/drawing/2014/main" val="3490027209"/>
+                  </a:ext>
+                </a:extLst>
+              </a:tr>
+            </a:tbl>
+          </a:graphicData>
+        </a:graphic>
+      </p:graphicFrame>
     </p:spTree>
     <p:extLst>
       <p:ext uri="{BB962C8B-B14F-4D97-AF65-F5344CB8AC3E}">

</xml_diff>

<commit_message>
chore[docs]: update report note
</commit_message>
<xml_diff>
--- a/docs/WeeklyNotes/Report-Sep28-2022-reasons-overview.pptx
+++ b/docs/WeeklyNotes/Report-Sep28-2022-reasons-overview.pptx
@@ -2787,7 +2787,7 @@
           <a:p>
             <a:fld id="{71BD4573-58E7-4156-A133-2731F5F8D1A6}" type="datetimeFigureOut">
               <a:rPr lang="en-US" smtClean="0"/>
-              <a:t>10/7/2022</a:t>
+              <a:t>10/12/2022</a:t>
             </a:fld>
             <a:endParaRPr lang="en-US"/>
           </a:p>
@@ -3452,7 +3452,7 @@
           <a:p>
             <a:fld id="{021A1D30-C0A0-4124-A783-34D9F15FA0FE}" type="datetime1">
               <a:rPr lang="en-US" smtClean="0"/>
-              <a:t>10/7/2022</a:t>
+              <a:t>10/12/2022</a:t>
             </a:fld>
             <a:endParaRPr lang="en-US"/>
           </a:p>
@@ -3636,7 +3636,7 @@
           <a:p>
             <a:fld id="{8D2D5871-AB0F-4B3D-8861-97E78CB7B47E}" type="datetime1">
               <a:rPr lang="en-US" smtClean="0"/>
-              <a:t>10/7/2022</a:t>
+              <a:t>10/12/2022</a:t>
             </a:fld>
             <a:endParaRPr lang="en-US"/>
           </a:p>
@@ -3830,7 +3830,7 @@
           <a:p>
             <a:fld id="{14418406-4C3F-4F3E-80BD-A22568EA37EB}" type="datetime1">
               <a:rPr lang="en-US" smtClean="0"/>
-              <a:t>10/7/2022</a:t>
+              <a:t>10/12/2022</a:t>
             </a:fld>
             <a:endParaRPr lang="en-US"/>
           </a:p>
@@ -4014,7 +4014,7 @@
           <a:p>
             <a:fld id="{65F28077-7188-48C5-8679-2287FAC952E9}" type="datetime1">
               <a:rPr lang="en-US" smtClean="0"/>
-              <a:t>10/7/2022</a:t>
+              <a:t>10/12/2022</a:t>
             </a:fld>
             <a:endParaRPr lang="en-US"/>
           </a:p>
@@ -4261,7 +4261,7 @@
           <a:p>
             <a:fld id="{D2DCB740-6776-4EE9-99FD-96D592FA5A23}" type="datetime1">
               <a:rPr lang="en-US" smtClean="0"/>
-              <a:t>10/7/2022</a:t>
+              <a:t>10/12/2022</a:t>
             </a:fld>
             <a:endParaRPr lang="en-US"/>
           </a:p>
@@ -4544,7 +4544,7 @@
           <a:p>
             <a:fld id="{05F6BD99-6FFD-46C5-B5E2-43A34BDA2566}" type="datetime1">
               <a:rPr lang="en-US" smtClean="0"/>
-              <a:t>10/7/2022</a:t>
+              <a:t>10/12/2022</a:t>
             </a:fld>
             <a:endParaRPr lang="en-US"/>
           </a:p>
@@ -4941,7 +4941,7 @@
           <a:p>
             <a:fld id="{E022678E-214C-4CF8-97C7-95015FB02960}" type="datetime1">
               <a:rPr lang="en-US" smtClean="0"/>
-              <a:t>10/7/2022</a:t>
+              <a:t>10/12/2022</a:t>
             </a:fld>
             <a:endParaRPr lang="en-US"/>
           </a:p>
@@ -5110,7 +5110,7 @@
           <a:p>
             <a:fld id="{D55660E0-FA77-4473-A859-74127B089143}" type="datetime1">
               <a:rPr lang="en-US" smtClean="0"/>
-              <a:t>10/7/2022</a:t>
+              <a:t>10/12/2022</a:t>
             </a:fld>
             <a:endParaRPr lang="en-US"/>
           </a:p>
@@ -5220,7 +5220,7 @@
           <a:p>
             <a:fld id="{3188D7B8-9F07-4899-827D-5F3CFDDEB574}" type="datetime1">
               <a:rPr lang="en-US" smtClean="0"/>
-              <a:t>10/7/2022</a:t>
+              <a:t>10/12/2022</a:t>
             </a:fld>
             <a:endParaRPr lang="en-US"/>
           </a:p>
@@ -5500,7 +5500,7 @@
           <a:p>
             <a:fld id="{B5197C5C-1CD1-417D-A89C-14747F5222C7}" type="datetime1">
               <a:rPr lang="en-US" smtClean="0"/>
-              <a:t>10/7/2022</a:t>
+              <a:t>10/12/2022</a:t>
             </a:fld>
             <a:endParaRPr lang="en-US"/>
           </a:p>
@@ -5853,7 +5853,7 @@
           <a:p>
             <a:fld id="{1359EFBB-CFA1-4AA8-9123-F0B52DBD84FE}" type="datetime1">
               <a:rPr lang="en-US" smtClean="0"/>
-              <a:t>10/7/2022</a:t>
+              <a:t>10/12/2022</a:t>
             </a:fld>
             <a:endParaRPr lang="en-US"/>
           </a:p>
@@ -6887,7 +6887,7 @@
             <a:fld id="{61146459-E3C3-4969-9224-5ED50B492D17}" type="datetime1">
               <a:rPr lang="en-US" smtClean="0"/>
               <a:pPr/>
-              <a:t>10/7/2022</a:t>
+              <a:t>10/12/2022</a:t>
             </a:fld>
             <a:endParaRPr lang="en-US" dirty="0"/>
           </a:p>
@@ -7927,10 +7927,10 @@
       </p:sp>
       <p:pic>
         <p:nvPicPr>
-          <p:cNvPr id="5" name="Picture 4" descr="Diagram&#10;&#10;Description automatically generated">
+          <p:cNvPr id="6" name="Picture 5" descr="Diagram, timeline&#10;&#10;Description automatically generated">
             <a:extLst>
               <a:ext uri="{FF2B5EF4-FFF2-40B4-BE49-F238E27FC236}">
-                <a16:creationId xmlns:a16="http://schemas.microsoft.com/office/drawing/2014/main" id="{5D4149DC-681D-BEF7-6611-5578304FCE3B}"/>
+                <a16:creationId xmlns:a16="http://schemas.microsoft.com/office/drawing/2014/main" id="{0FA7CE22-E4B3-ED01-56D4-46811B403405}"/>
               </a:ext>
             </a:extLst>
           </p:cNvPr>
@@ -7953,8 +7953,8 @@
         </p:blipFill>
         <p:spPr>
           <a:xfrm>
-            <a:off x="419100" y="2790388"/>
-            <a:ext cx="11353800" cy="2971800"/>
+            <a:off x="0" y="2990088"/>
+            <a:ext cx="12192000" cy="2619769"/>
           </a:xfrm>
           <a:prstGeom prst="rect">
             <a:avLst/>
@@ -8047,7 +8047,7 @@
             <p:ph idx="1"/>
             <p:extLst>
               <p:ext uri="{D42A27DB-BD31-4B8C-83A1-F6EECF244321}">
-                <p14:modId xmlns:p14="http://schemas.microsoft.com/office/powerpoint/2010/main" val="1295064176"/>
+                <p14:modId xmlns:p14="http://schemas.microsoft.com/office/powerpoint/2010/main" val="327136000"/>
               </p:ext>
             </p:extLst>
           </p:nvPr>
@@ -8291,65 +8291,6 @@
                     <a:p>
                       <a:r>
                         <a:rPr lang="en-US" dirty="0"/>
-                        <a:t>Stage 3</a:t>
-                      </a:r>
-                    </a:p>
-                  </a:txBody>
-                  <a:tcPr/>
-                </a:tc>
-                <a:tc>
-                  <a:txBody>
-                    <a:bodyPr/>
-                    <a:lstStyle/>
-                    <a:p>
-                      <a:r>
-                        <a:rPr lang="en-US" dirty="0"/>
-                        <a:t>Road Segmentation</a:t>
-                      </a:r>
-                    </a:p>
-                  </a:txBody>
-                  <a:tcPr/>
-                </a:tc>
-                <a:tc>
-                  <a:txBody>
-                    <a:bodyPr/>
-                    <a:lstStyle/>
-                    <a:p>
-                      <a:r>
-                        <a:rPr lang="en-US" dirty="0"/>
-                        <a:t>Image Thresholding</a:t>
-                      </a:r>
-                    </a:p>
-                  </a:txBody>
-                  <a:tcPr/>
-                </a:tc>
-                <a:tc>
-                  <a:txBody>
-                    <a:bodyPr/>
-                    <a:lstStyle/>
-                    <a:p>
-                      <a:r>
-                        <a:rPr lang="en-US" dirty="0"/>
-                        <a:t>Differentiate Lane lines and other segment</a:t>
-                      </a:r>
-                    </a:p>
-                  </a:txBody>
-                  <a:tcPr/>
-                </a:tc>
-                <a:extLst>
-                  <a:ext uri="{0D108BD9-81ED-4DB2-BD59-A6C34878D82A}">
-                    <a16:rowId xmlns:a16="http://schemas.microsoft.com/office/drawing/2014/main" val="3021584971"/>
-                  </a:ext>
-                </a:extLst>
-              </a:tr>
-              <a:tr h="370840">
-                <a:tc>
-                  <a:txBody>
-                    <a:bodyPr/>
-                    <a:lstStyle/>
-                    <a:p>
-                      <a:r>
-                        <a:rPr lang="en-US" dirty="0"/>
                         <a:t>Stage 4</a:t>
                       </a:r>
                     </a:p>
@@ -8396,6 +8337,65 @@
                       <a:r>
                         <a:rPr lang="en-US" dirty="0"/>
                         <a:t>Curvature Calculation</a:t>
+                      </a:r>
+                    </a:p>
+                  </a:txBody>
+                  <a:tcPr/>
+                </a:tc>
+                <a:extLst>
+                  <a:ext uri="{0D108BD9-81ED-4DB2-BD59-A6C34878D82A}">
+                    <a16:rowId xmlns:a16="http://schemas.microsoft.com/office/drawing/2014/main" val="3021584971"/>
+                  </a:ext>
+                </a:extLst>
+              </a:tr>
+              <a:tr h="370840">
+                <a:tc>
+                  <a:txBody>
+                    <a:bodyPr/>
+                    <a:lstStyle/>
+                    <a:p>
+                      <a:r>
+                        <a:rPr lang="en-US" dirty="0"/>
+                        <a:t>Stage 3</a:t>
+                      </a:r>
+                    </a:p>
+                  </a:txBody>
+                  <a:tcPr/>
+                </a:tc>
+                <a:tc>
+                  <a:txBody>
+                    <a:bodyPr/>
+                    <a:lstStyle/>
+                    <a:p>
+                      <a:r>
+                        <a:rPr lang="en-US" dirty="0"/>
+                        <a:t>Road Segmentation</a:t>
+                      </a:r>
+                    </a:p>
+                  </a:txBody>
+                  <a:tcPr/>
+                </a:tc>
+                <a:tc>
+                  <a:txBody>
+                    <a:bodyPr/>
+                    <a:lstStyle/>
+                    <a:p>
+                      <a:r>
+                        <a:rPr lang="en-US" dirty="0"/>
+                        <a:t>Image Thresholding</a:t>
+                      </a:r>
+                    </a:p>
+                  </a:txBody>
+                  <a:tcPr/>
+                </a:tc>
+                <a:tc>
+                  <a:txBody>
+                    <a:bodyPr/>
+                    <a:lstStyle/>
+                    <a:p>
+                      <a:r>
+                        <a:rPr lang="en-US" dirty="0"/>
+                        <a:t>Differentiate Lane lines and other segment</a:t>
                       </a:r>
                     </a:p>
                   </a:txBody>

</xml_diff>